<commit_message>
Update Using Source Generators for Fun (and Maybe Profit).pptx
</commit_message>
<xml_diff>
--- a/Using Source Generators for Fun (and Maybe Profit).pptx
+++ b/Using Source Generators for Fun (and Maybe Profit).pptx
@@ -135,7 +135,7 @@
 <file path=ppt/revisionInfo.xml><?xml version="1.0" encoding="utf-8"?>
 <p1510:revInfo xmlns:a="http://schemas.openxmlformats.org/drawingml/2006/main" xmlns:r="http://schemas.openxmlformats.org/officeDocument/2006/relationships" xmlns:p1510="http://schemas.microsoft.com/office/powerpoint/2015/10/main">
   <p1510:revLst>
-    <p1510:client id="{D1C467D2-E14D-42B6-98E2-48FF10CA2302}" v="56" dt="2021-03-02T15:50:06.917"/>
+    <p1510:client id="{D1C467D2-E14D-42B6-98E2-48FF10CA2302}" v="70" dt="2021-03-03T20:27:05.077"/>
   </p1510:revLst>
 </p1510:revInfo>
 </file>
@@ -145,7 +145,7 @@
   <pc:docChgLst>
     <pc:chgData name="JASON BOCK" userId="96bbd135532818bd" providerId="LiveId" clId="{D1C467D2-E14D-42B6-98E2-48FF10CA2302}"/>
     <pc:docChg chg="undo redo custSel addSld delSld modSld">
-      <pc:chgData name="JASON BOCK" userId="96bbd135532818bd" providerId="LiveId" clId="{D1C467D2-E14D-42B6-98E2-48FF10CA2302}" dt="2021-03-02T15:56:01.096" v="5018"/>
+      <pc:chgData name="JASON BOCK" userId="96bbd135532818bd" providerId="LiveId" clId="{D1C467D2-E14D-42B6-98E2-48FF10CA2302}" dt="2021-03-03T20:27:05.077" v="5036" actId="20577"/>
       <pc:docMkLst>
         <pc:docMk/>
       </pc:docMkLst>
@@ -708,13 +708,13 @@
         </pc:cxnChg>
       </pc:sldChg>
       <pc:sldChg chg="modSp add mod modNotesTx">
-        <pc:chgData name="JASON BOCK" userId="96bbd135532818bd" providerId="LiveId" clId="{D1C467D2-E14D-42B6-98E2-48FF10CA2302}" dt="2021-03-02T15:29:35.125" v="4048" actId="692"/>
+        <pc:chgData name="JASON BOCK" userId="96bbd135532818bd" providerId="LiveId" clId="{D1C467D2-E14D-42B6-98E2-48FF10CA2302}" dt="2021-03-03T19:35:38.394" v="5022" actId="20577"/>
         <pc:sldMkLst>
           <pc:docMk/>
           <pc:sldMk cId="1128462601" sldId="386"/>
         </pc:sldMkLst>
         <pc:spChg chg="mod">
-          <ac:chgData name="JASON BOCK" userId="96bbd135532818bd" providerId="LiveId" clId="{D1C467D2-E14D-42B6-98E2-48FF10CA2302}" dt="2021-03-02T15:29:35.125" v="4048" actId="692"/>
+          <ac:chgData name="JASON BOCK" userId="96bbd135532818bd" providerId="LiveId" clId="{D1C467D2-E14D-42B6-98E2-48FF10CA2302}" dt="2021-03-03T19:35:38.394" v="5022" actId="20577"/>
           <ac:spMkLst>
             <pc:docMk/>
             <pc:sldMk cId="1128462601" sldId="386"/>
@@ -854,7 +854,7 @@
         </pc:cxnChg>
       </pc:sldChg>
       <pc:sldChg chg="addSp delSp modSp add mod modNotesTx">
-        <pc:chgData name="JASON BOCK" userId="96bbd135532818bd" providerId="LiveId" clId="{D1C467D2-E14D-42B6-98E2-48FF10CA2302}" dt="2021-03-02T15:50:49.597" v="4844" actId="20577"/>
+        <pc:chgData name="JASON BOCK" userId="96bbd135532818bd" providerId="LiveId" clId="{D1C467D2-E14D-42B6-98E2-48FF10CA2302}" dt="2021-03-03T20:27:05.077" v="5036" actId="20577"/>
         <pc:sldMkLst>
           <pc:docMk/>
           <pc:sldMk cId="1850898818" sldId="391"/>
@@ -868,7 +868,7 @@
           </ac:spMkLst>
         </pc:spChg>
         <pc:graphicFrameChg chg="add mod">
-          <ac:chgData name="JASON BOCK" userId="96bbd135532818bd" providerId="LiveId" clId="{D1C467D2-E14D-42B6-98E2-48FF10CA2302}" dt="2021-03-02T15:50:06.917" v="4667" actId="20577"/>
+          <ac:chgData name="JASON BOCK" userId="96bbd135532818bd" providerId="LiveId" clId="{D1C467D2-E14D-42B6-98E2-48FF10CA2302}" dt="2021-03-03T20:27:05.077" v="5036" actId="20577"/>
           <ac:graphicFrameMkLst>
             <pc:docMk/>
             <pc:sldMk cId="1850898818" sldId="391"/>
@@ -1730,7 +1730,7 @@
         <a:lstStyle/>
         <a:p>
           <a:r>
-            <a:rPr lang="en-US"/>
+            <a:rPr lang="en-US" dirty="0"/>
             <a:t>Proxies</a:t>
           </a:r>
         </a:p>
@@ -1830,6 +1830,42 @@
         </a:p>
       </dgm:t>
     </dgm:pt>
+    <dgm:pt modelId="{363FAC0C-2A4A-43C5-B2A4-06B2D20A3DD0}">
+      <dgm:prSet/>
+      <dgm:spPr/>
+      <dgm:t>
+        <a:bodyPr/>
+        <a:lstStyle/>
+        <a:p>
+          <a:r>
+            <a:rPr lang="en-US" dirty="0"/>
+            <a:t>Serialization</a:t>
+          </a:r>
+        </a:p>
+      </dgm:t>
+    </dgm:pt>
+    <dgm:pt modelId="{0529EFF7-2D7C-467F-A39F-E4C27B286000}" type="parTrans" cxnId="{3616973D-461A-446B-B4B9-732A891B840E}">
+      <dgm:prSet/>
+      <dgm:spPr/>
+      <dgm:t>
+        <a:bodyPr/>
+        <a:lstStyle/>
+        <a:p>
+          <a:endParaRPr lang="en-US"/>
+        </a:p>
+      </dgm:t>
+    </dgm:pt>
+    <dgm:pt modelId="{F858EC04-000B-470F-9377-FD21D9ED26B4}" type="sibTrans" cxnId="{3616973D-461A-446B-B4B9-732A891B840E}">
+      <dgm:prSet/>
+      <dgm:spPr/>
+      <dgm:t>
+        <a:bodyPr/>
+        <a:lstStyle/>
+        <a:p>
+          <a:endParaRPr lang="en-US"/>
+        </a:p>
+      </dgm:t>
+    </dgm:pt>
     <dgm:pt modelId="{83D11995-765A-457C-8808-F6F381CA0B90}" type="pres">
       <dgm:prSet presAssocID="{42227AAB-6D1F-4B39-9A97-5DCDE1CBA7B3}" presName="diagram" presStyleCnt="0">
         <dgm:presLayoutVars>
@@ -1840,7 +1876,7 @@
       <dgm:spPr/>
     </dgm:pt>
     <dgm:pt modelId="{588988D7-D038-4D8D-A0D4-D07291CC1F74}" type="pres">
-      <dgm:prSet presAssocID="{B3B9E699-299A-414B-86A5-CCBCC86065C5}" presName="node" presStyleLbl="node1" presStyleIdx="0" presStyleCnt="5">
+      <dgm:prSet presAssocID="{B3B9E699-299A-414B-86A5-CCBCC86065C5}" presName="node" presStyleLbl="node1" presStyleIdx="0" presStyleCnt="6">
         <dgm:presLayoutVars>
           <dgm:bulletEnabled val="1"/>
         </dgm:presLayoutVars>
@@ -1852,7 +1888,7 @@
       <dgm:spPr/>
     </dgm:pt>
     <dgm:pt modelId="{E61EC2C4-7294-4E7A-B807-1E7F0B0FCA51}" type="pres">
-      <dgm:prSet presAssocID="{32EF007B-4888-41C3-BB37-2DC1FC2B935E}" presName="node" presStyleLbl="node1" presStyleIdx="1" presStyleCnt="5">
+      <dgm:prSet presAssocID="{32EF007B-4888-41C3-BB37-2DC1FC2B935E}" presName="node" presStyleLbl="node1" presStyleIdx="1" presStyleCnt="6">
         <dgm:presLayoutVars>
           <dgm:bulletEnabled val="1"/>
         </dgm:presLayoutVars>
@@ -1864,7 +1900,7 @@
       <dgm:spPr/>
     </dgm:pt>
     <dgm:pt modelId="{4D20AFBF-7DC4-4AA0-8EFA-9B2B16E5987F}" type="pres">
-      <dgm:prSet presAssocID="{7F0522B7-1464-4F7F-938D-5D663ACA3E41}" presName="node" presStyleLbl="node1" presStyleIdx="2" presStyleCnt="5">
+      <dgm:prSet presAssocID="{7F0522B7-1464-4F7F-938D-5D663ACA3E41}" presName="node" presStyleLbl="node1" presStyleIdx="2" presStyleCnt="6">
         <dgm:presLayoutVars>
           <dgm:bulletEnabled val="1"/>
         </dgm:presLayoutVars>
@@ -1876,7 +1912,7 @@
       <dgm:spPr/>
     </dgm:pt>
     <dgm:pt modelId="{A8FCB0B9-6422-4AAA-A92A-B86EACC257AB}" type="pres">
-      <dgm:prSet presAssocID="{82E5D8C3-1D58-4F0D-A917-847C5116D765}" presName="node" presStyleLbl="node1" presStyleIdx="3" presStyleCnt="5">
+      <dgm:prSet presAssocID="{82E5D8C3-1D58-4F0D-A917-847C5116D765}" presName="node" presStyleLbl="node1" presStyleIdx="3" presStyleCnt="6">
         <dgm:presLayoutVars>
           <dgm:bulletEnabled val="1"/>
         </dgm:presLayoutVars>
@@ -1887,8 +1923,20 @@
       <dgm:prSet presAssocID="{33EA9731-782B-454D-96FC-27822321AC6E}" presName="sibTrans" presStyleCnt="0"/>
       <dgm:spPr/>
     </dgm:pt>
+    <dgm:pt modelId="{BA0D26FF-9BB3-4A94-831E-3CC09238ED7E}" type="pres">
+      <dgm:prSet presAssocID="{363FAC0C-2A4A-43C5-B2A4-06B2D20A3DD0}" presName="node" presStyleLbl="node1" presStyleIdx="4" presStyleCnt="6">
+        <dgm:presLayoutVars>
+          <dgm:bulletEnabled val="1"/>
+        </dgm:presLayoutVars>
+      </dgm:prSet>
+      <dgm:spPr/>
+    </dgm:pt>
+    <dgm:pt modelId="{D24CCFD2-C988-495D-919D-787F587E75FA}" type="pres">
+      <dgm:prSet presAssocID="{F858EC04-000B-470F-9377-FD21D9ED26B4}" presName="sibTrans" presStyleCnt="0"/>
+      <dgm:spPr/>
+    </dgm:pt>
     <dgm:pt modelId="{C2A68CBC-D4C7-4DF4-AD21-E5A627471B93}" type="pres">
-      <dgm:prSet presAssocID="{768BB71B-295B-4A31-9000-32680C1EAF37}" presName="node" presStyleLbl="node1" presStyleIdx="4" presStyleCnt="5">
+      <dgm:prSet presAssocID="{768BB71B-295B-4A31-9000-32680C1EAF37}" presName="node" presStyleLbl="node1" presStyleIdx="5" presStyleCnt="6">
         <dgm:presLayoutVars>
           <dgm:bulletEnabled val="1"/>
         </dgm:presLayoutVars>
@@ -1902,11 +1950,13 @@
     <dgm:cxn modelId="{BDF0842A-DD41-4FA4-A86F-217FF9DAE93D}" type="presOf" srcId="{B3B9E699-299A-414B-86A5-CCBCC86065C5}" destId="{588988D7-D038-4D8D-A0D4-D07291CC1F74}" srcOrd="0" destOrd="0" presId="urn:microsoft.com/office/officeart/2005/8/layout/default"/>
     <dgm:cxn modelId="{3F971436-6759-4398-BC33-7E72512751C6}" type="presOf" srcId="{82E5D8C3-1D58-4F0D-A917-847C5116D765}" destId="{A8FCB0B9-6422-4AAA-A92A-B86EACC257AB}" srcOrd="0" destOrd="0" presId="urn:microsoft.com/office/officeart/2005/8/layout/default"/>
     <dgm:cxn modelId="{05320F39-342D-4C8D-97E5-9C66944BA1BB}" type="presOf" srcId="{7F0522B7-1464-4F7F-938D-5D663ACA3E41}" destId="{4D20AFBF-7DC4-4AA0-8EFA-9B2B16E5987F}" srcOrd="0" destOrd="0" presId="urn:microsoft.com/office/officeart/2005/8/layout/default"/>
+    <dgm:cxn modelId="{3616973D-461A-446B-B4B9-732A891B840E}" srcId="{42227AAB-6D1F-4B39-9A97-5DCDE1CBA7B3}" destId="{363FAC0C-2A4A-43C5-B2A4-06B2D20A3DD0}" srcOrd="4" destOrd="0" parTransId="{0529EFF7-2D7C-467F-A39F-E4C27B286000}" sibTransId="{F858EC04-000B-470F-9377-FD21D9ED26B4}"/>
     <dgm:cxn modelId="{B5451658-3767-439F-8A2F-CC1819A16F78}" srcId="{42227AAB-6D1F-4B39-9A97-5DCDE1CBA7B3}" destId="{82E5D8C3-1D58-4F0D-A917-847C5116D765}" srcOrd="3" destOrd="0" parTransId="{D60F881E-4B79-49E6-B115-8F8722805C8C}" sibTransId="{33EA9731-782B-454D-96FC-27822321AC6E}"/>
     <dgm:cxn modelId="{2AA2F179-7062-4B33-988E-9EB0C4B81D4C}" srcId="{42227AAB-6D1F-4B39-9A97-5DCDE1CBA7B3}" destId="{32EF007B-4888-41C3-BB37-2DC1FC2B935E}" srcOrd="1" destOrd="0" parTransId="{73BE9578-2B2E-4C9B-8713-997C04E1C6A4}" sibTransId="{6ADA8CB9-E6C9-4DD7-A855-B61D9848233B}"/>
     <dgm:cxn modelId="{16AD1F7D-D608-4CC7-9E58-D0E0EACBC3C3}" type="presOf" srcId="{32EF007B-4888-41C3-BB37-2DC1FC2B935E}" destId="{E61EC2C4-7294-4E7A-B807-1E7F0B0FCA51}" srcOrd="0" destOrd="0" presId="urn:microsoft.com/office/officeart/2005/8/layout/default"/>
+    <dgm:cxn modelId="{03E12889-4F16-4153-9FBC-693B265F13B9}" type="presOf" srcId="{363FAC0C-2A4A-43C5-B2A4-06B2D20A3DD0}" destId="{BA0D26FF-9BB3-4A94-831E-3CC09238ED7E}" srcOrd="0" destOrd="0" presId="urn:microsoft.com/office/officeart/2005/8/layout/default"/>
     <dgm:cxn modelId="{4480B18A-2824-4B3C-8481-6C0E5011FDB9}" type="presOf" srcId="{42227AAB-6D1F-4B39-9A97-5DCDE1CBA7B3}" destId="{83D11995-765A-457C-8808-F6F381CA0B90}" srcOrd="0" destOrd="0" presId="urn:microsoft.com/office/officeart/2005/8/layout/default"/>
-    <dgm:cxn modelId="{CA508C94-F29E-4013-B27D-B0117321A01B}" srcId="{42227AAB-6D1F-4B39-9A97-5DCDE1CBA7B3}" destId="{768BB71B-295B-4A31-9000-32680C1EAF37}" srcOrd="4" destOrd="0" parTransId="{FE460F42-C4F6-4A00-A24B-A9DEEE779ED9}" sibTransId="{E3FF549C-79E7-4165-8146-062CABC00455}"/>
+    <dgm:cxn modelId="{CA508C94-F29E-4013-B27D-B0117321A01B}" srcId="{42227AAB-6D1F-4B39-9A97-5DCDE1CBA7B3}" destId="{768BB71B-295B-4A31-9000-32680C1EAF37}" srcOrd="5" destOrd="0" parTransId="{FE460F42-C4F6-4A00-A24B-A9DEEE779ED9}" sibTransId="{E3FF549C-79E7-4165-8146-062CABC00455}"/>
     <dgm:cxn modelId="{0B9930C9-6B5A-450F-B12C-013A996F0C1B}" type="presOf" srcId="{768BB71B-295B-4A31-9000-32680C1EAF37}" destId="{C2A68CBC-D4C7-4DF4-AD21-E5A627471B93}" srcOrd="0" destOrd="0" presId="urn:microsoft.com/office/officeart/2005/8/layout/default"/>
     <dgm:cxn modelId="{1A6742F6-AEA2-49A0-84B6-6CFC2B4E407A}" type="presParOf" srcId="{83D11995-765A-457C-8808-F6F381CA0B90}" destId="{588988D7-D038-4D8D-A0D4-D07291CC1F74}" srcOrd="0" destOrd="0" presId="urn:microsoft.com/office/officeart/2005/8/layout/default"/>
     <dgm:cxn modelId="{6B8F7656-AD8C-4D48-A992-E9FA10AF1FAB}" type="presParOf" srcId="{83D11995-765A-457C-8808-F6F381CA0B90}" destId="{82D0C549-842A-4628-B181-9703C4E3A4FD}" srcOrd="1" destOrd="0" presId="urn:microsoft.com/office/officeart/2005/8/layout/default"/>
@@ -1916,7 +1966,9 @@
     <dgm:cxn modelId="{35570245-73AB-4093-9F27-F99DACC7B4C3}" type="presParOf" srcId="{83D11995-765A-457C-8808-F6F381CA0B90}" destId="{639E38D9-5D07-4F08-A84C-530AEF367A78}" srcOrd="5" destOrd="0" presId="urn:microsoft.com/office/officeart/2005/8/layout/default"/>
     <dgm:cxn modelId="{1E14A4E7-AF56-4889-AEB9-EE7BB58E44F0}" type="presParOf" srcId="{83D11995-765A-457C-8808-F6F381CA0B90}" destId="{A8FCB0B9-6422-4AAA-A92A-B86EACC257AB}" srcOrd="6" destOrd="0" presId="urn:microsoft.com/office/officeart/2005/8/layout/default"/>
     <dgm:cxn modelId="{0E754041-3AB9-469C-B935-99CECE1B455C}" type="presParOf" srcId="{83D11995-765A-457C-8808-F6F381CA0B90}" destId="{963A8615-8FC3-4250-9F5B-634ACA3B5C58}" srcOrd="7" destOrd="0" presId="urn:microsoft.com/office/officeart/2005/8/layout/default"/>
-    <dgm:cxn modelId="{F7500EFF-34D1-43A0-B1C7-026E28B279C8}" type="presParOf" srcId="{83D11995-765A-457C-8808-F6F381CA0B90}" destId="{C2A68CBC-D4C7-4DF4-AD21-E5A627471B93}" srcOrd="8" destOrd="0" presId="urn:microsoft.com/office/officeart/2005/8/layout/default"/>
+    <dgm:cxn modelId="{F2625B42-A30A-412A-8D26-354474B12E04}" type="presParOf" srcId="{83D11995-765A-457C-8808-F6F381CA0B90}" destId="{BA0D26FF-9BB3-4A94-831E-3CC09238ED7E}" srcOrd="8" destOrd="0" presId="urn:microsoft.com/office/officeart/2005/8/layout/default"/>
+    <dgm:cxn modelId="{6793555C-2010-49F9-9A42-390BDA04C503}" type="presParOf" srcId="{83D11995-765A-457C-8808-F6F381CA0B90}" destId="{D24CCFD2-C988-495D-919D-787F587E75FA}" srcOrd="9" destOrd="0" presId="urn:microsoft.com/office/officeart/2005/8/layout/default"/>
+    <dgm:cxn modelId="{F7500EFF-34D1-43A0-B1C7-026E28B279C8}" type="presParOf" srcId="{83D11995-765A-457C-8808-F6F381CA0B90}" destId="{C2A68CBC-D4C7-4DF4-AD21-E5A627471B93}" srcOrd="10" destOrd="0" presId="urn:microsoft.com/office/officeart/2005/8/layout/default"/>
   </dgm:cxnLst>
   <dgm:bg/>
   <dgm:whole/>
@@ -1986,12 +2038,12 @@
         </a:fontRef>
       </dsp:style>
       <dsp:txBody>
-        <a:bodyPr spcFirstLastPara="0" vert="horz" wrap="square" lIns="209550" tIns="209550" rIns="209550" bIns="209550" numCol="1" spcCol="1270" anchor="ctr" anchorCtr="0">
+        <a:bodyPr spcFirstLastPara="0" vert="horz" wrap="square" lIns="175260" tIns="175260" rIns="175260" bIns="175260" numCol="1" spcCol="1270" anchor="ctr" anchorCtr="0">
           <a:noAutofit/>
         </a:bodyPr>
         <a:lstStyle/>
         <a:p>
-          <a:pPr marL="0" lvl="0" indent="0" algn="ctr" defTabSz="2444750">
+          <a:pPr marL="0" lvl="0" indent="0" algn="ctr" defTabSz="2044700">
             <a:lnSpc>
               <a:spcPct val="90000"/>
             </a:lnSpc>
@@ -2004,7 +2056,7 @@
             <a:buNone/>
           </a:pPr>
           <a:r>
-            <a:rPr lang="en-US" sz="5500" kern="1200"/>
+            <a:rPr lang="en-US" sz="4600" kern="1200"/>
             <a:t>Blazor Routes</a:t>
           </a:r>
         </a:p>
@@ -2064,12 +2116,12 @@
         </a:fontRef>
       </dsp:style>
       <dsp:txBody>
-        <a:bodyPr spcFirstLastPara="0" vert="horz" wrap="square" lIns="209550" tIns="209550" rIns="209550" bIns="209550" numCol="1" spcCol="1270" anchor="ctr" anchorCtr="0">
+        <a:bodyPr spcFirstLastPara="0" vert="horz" wrap="square" lIns="175260" tIns="175260" rIns="175260" bIns="175260" numCol="1" spcCol="1270" anchor="ctr" anchorCtr="0">
           <a:noAutofit/>
         </a:bodyPr>
         <a:lstStyle/>
         <a:p>
-          <a:pPr marL="0" lvl="0" indent="0" algn="ctr" defTabSz="2444750">
+          <a:pPr marL="0" lvl="0" indent="0" algn="ctr" defTabSz="2044700">
             <a:lnSpc>
               <a:spcPct val="90000"/>
             </a:lnSpc>
@@ -2082,7 +2134,7 @@
             <a:buNone/>
           </a:pPr>
           <a:r>
-            <a:rPr lang="en-US" sz="5500" kern="1200"/>
+            <a:rPr lang="en-US" sz="4600" kern="1200"/>
             <a:t>DSLs</a:t>
           </a:r>
         </a:p>
@@ -2142,12 +2194,12 @@
         </a:fontRef>
       </dsp:style>
       <dsp:txBody>
-        <a:bodyPr spcFirstLastPara="0" vert="horz" wrap="square" lIns="209550" tIns="209550" rIns="209550" bIns="209550" numCol="1" spcCol="1270" anchor="ctr" anchorCtr="0">
+        <a:bodyPr spcFirstLastPara="0" vert="horz" wrap="square" lIns="175260" tIns="175260" rIns="175260" bIns="175260" numCol="1" spcCol="1270" anchor="ctr" anchorCtr="0">
           <a:noAutofit/>
         </a:bodyPr>
         <a:lstStyle/>
         <a:p>
-          <a:pPr marL="0" lvl="0" indent="0" algn="ctr" defTabSz="2444750">
+          <a:pPr marL="0" lvl="0" indent="0" algn="ctr" defTabSz="2044700">
             <a:lnSpc>
               <a:spcPct val="90000"/>
             </a:lnSpc>
@@ -2160,7 +2212,7 @@
             <a:buNone/>
           </a:pPr>
           <a:r>
-            <a:rPr lang="en-US" sz="5500" kern="1200"/>
+            <a:rPr lang="en-US" sz="4600" kern="1200" dirty="0"/>
             <a:t>Proxies</a:t>
           </a:r>
         </a:p>
@@ -2177,7 +2229,7 @@
       </dsp:nvSpPr>
       <dsp:spPr>
         <a:xfrm>
-          <a:off x="1807368" y="2339975"/>
+          <a:off x="0" y="2339975"/>
           <a:ext cx="3286125" cy="1971675"/>
         </a:xfrm>
         <a:prstGeom prst="rect">
@@ -2220,12 +2272,12 @@
         </a:fontRef>
       </dsp:style>
       <dsp:txBody>
-        <a:bodyPr spcFirstLastPara="0" vert="horz" wrap="square" lIns="209550" tIns="209550" rIns="209550" bIns="209550" numCol="1" spcCol="1270" anchor="ctr" anchorCtr="0">
+        <a:bodyPr spcFirstLastPara="0" vert="horz" wrap="square" lIns="175260" tIns="175260" rIns="175260" bIns="175260" numCol="1" spcCol="1270" anchor="ctr" anchorCtr="0">
           <a:noAutofit/>
         </a:bodyPr>
         <a:lstStyle/>
         <a:p>
-          <a:pPr marL="0" lvl="0" indent="0" algn="ctr" defTabSz="2444750">
+          <a:pPr marL="0" lvl="0" indent="0" algn="ctr" defTabSz="2044700">
             <a:lnSpc>
               <a:spcPct val="90000"/>
             </a:lnSpc>
@@ -2238,24 +2290,24 @@
             <a:buNone/>
           </a:pPr>
           <a:r>
-            <a:rPr lang="en-US" sz="5500" kern="1200" dirty="0"/>
+            <a:rPr lang="en-US" sz="4600" kern="1200" dirty="0"/>
             <a:t>IOC</a:t>
           </a:r>
         </a:p>
       </dsp:txBody>
       <dsp:txXfrm>
-        <a:off x="1807368" y="2339975"/>
+        <a:off x="0" y="2339975"/>
         <a:ext cx="3286125" cy="1971675"/>
       </dsp:txXfrm>
     </dsp:sp>
-    <dsp:sp modelId="{C2A68CBC-D4C7-4DF4-AD21-E5A627471B93}">
+    <dsp:sp modelId="{BA0D26FF-9BB3-4A94-831E-3CC09238ED7E}">
       <dsp:nvSpPr>
         <dsp:cNvPr id="0" name=""/>
         <dsp:cNvSpPr/>
       </dsp:nvSpPr>
       <dsp:spPr>
         <a:xfrm>
-          <a:off x="5422106" y="2339975"/>
+          <a:off x="3614737" y="2339975"/>
           <a:ext cx="3286125" cy="1971675"/>
         </a:xfrm>
         <a:prstGeom prst="rect">
@@ -2298,12 +2350,12 @@
         </a:fontRef>
       </dsp:style>
       <dsp:txBody>
-        <a:bodyPr spcFirstLastPara="0" vert="horz" wrap="square" lIns="209550" tIns="209550" rIns="209550" bIns="209550" numCol="1" spcCol="1270" anchor="ctr" anchorCtr="0">
+        <a:bodyPr spcFirstLastPara="0" vert="horz" wrap="square" lIns="175260" tIns="175260" rIns="175260" bIns="175260" numCol="1" spcCol="1270" anchor="ctr" anchorCtr="0">
           <a:noAutofit/>
         </a:bodyPr>
         <a:lstStyle/>
         <a:p>
-          <a:pPr marL="0" lvl="0" indent="0" algn="ctr" defTabSz="2444750">
+          <a:pPr marL="0" lvl="0" indent="0" algn="ctr" defTabSz="2044700">
             <a:lnSpc>
               <a:spcPct val="90000"/>
             </a:lnSpc>
@@ -2316,13 +2368,91 @@
             <a:buNone/>
           </a:pPr>
           <a:r>
-            <a:rPr lang="en-US" sz="5500" kern="1200"/>
+            <a:rPr lang="en-US" sz="4600" kern="1200" dirty="0"/>
+            <a:t>Serialization</a:t>
+          </a:r>
+        </a:p>
+      </dsp:txBody>
+      <dsp:txXfrm>
+        <a:off x="3614737" y="2339975"/>
+        <a:ext cx="3286125" cy="1971675"/>
+      </dsp:txXfrm>
+    </dsp:sp>
+    <dsp:sp modelId="{C2A68CBC-D4C7-4DF4-AD21-E5A627471B93}">
+      <dsp:nvSpPr>
+        <dsp:cNvPr id="0" name=""/>
+        <dsp:cNvSpPr/>
+      </dsp:nvSpPr>
+      <dsp:spPr>
+        <a:xfrm>
+          <a:off x="7229475" y="2339975"/>
+          <a:ext cx="3286125" cy="1971675"/>
+        </a:xfrm>
+        <a:prstGeom prst="rect">
+          <a:avLst/>
+        </a:prstGeom>
+        <a:solidFill>
+          <a:schemeClr val="accent1">
+            <a:hueOff val="0"/>
+            <a:satOff val="0"/>
+            <a:lumOff val="0"/>
+            <a:alphaOff val="0"/>
+          </a:schemeClr>
+        </a:solidFill>
+        <a:ln w="12700" cap="flat" cmpd="sng" algn="ctr">
+          <a:solidFill>
+            <a:schemeClr val="lt1">
+              <a:hueOff val="0"/>
+              <a:satOff val="0"/>
+              <a:lumOff val="0"/>
+              <a:alphaOff val="0"/>
+            </a:schemeClr>
+          </a:solidFill>
+          <a:prstDash val="solid"/>
+          <a:miter lim="800000"/>
+        </a:ln>
+        <a:effectLst/>
+      </dsp:spPr>
+      <dsp:style>
+        <a:lnRef idx="2">
+          <a:scrgbClr r="0" g="0" b="0"/>
+        </a:lnRef>
+        <a:fillRef idx="1">
+          <a:scrgbClr r="0" g="0" b="0"/>
+        </a:fillRef>
+        <a:effectRef idx="0">
+          <a:scrgbClr r="0" g="0" b="0"/>
+        </a:effectRef>
+        <a:fontRef idx="minor">
+          <a:schemeClr val="lt1"/>
+        </a:fontRef>
+      </dsp:style>
+      <dsp:txBody>
+        <a:bodyPr spcFirstLastPara="0" vert="horz" wrap="square" lIns="175260" tIns="175260" rIns="175260" bIns="175260" numCol="1" spcCol="1270" anchor="ctr" anchorCtr="0">
+          <a:noAutofit/>
+        </a:bodyPr>
+        <a:lstStyle/>
+        <a:p>
+          <a:pPr marL="0" lvl="0" indent="0" algn="ctr" defTabSz="2044700">
+            <a:lnSpc>
+              <a:spcPct val="90000"/>
+            </a:lnSpc>
+            <a:spcBef>
+              <a:spcPct val="0"/>
+            </a:spcBef>
+            <a:spcAft>
+              <a:spcPct val="35000"/>
+            </a:spcAft>
+            <a:buNone/>
+          </a:pPr>
+          <a:r>
+            <a:rPr lang="en-US" sz="4600" kern="1200"/>
             <a:t>And more!</a:t>
           </a:r>
         </a:p>
       </dsp:txBody>
       <dsp:txXfrm>
-        <a:off x="5422106" y="2339975"/>
+        <a:off x="7229475" y="2339975"/>
         <a:ext cx="3286125" cy="1971675"/>
       </dsp:txXfrm>
     </dsp:sp>
@@ -3593,7 +3723,7 @@
           <a:p>
             <a:fld id="{3BF7900A-5984-4627-90CC-DA4A16B17B42}" type="datetimeFigureOut">
               <a:rPr lang="en-US" smtClean="0"/>
-              <a:t>3/2/2021</a:t>
+              <a:t>3/3/2021</a:t>
             </a:fld>
             <a:endParaRPr lang="en-US"/>
           </a:p>
@@ -5543,7 +5673,7 @@
           <a:p>
             <a:fld id="{3B9F33C8-8A6A-49A2-8949-28E9F813AC6F}" type="datetimeFigureOut">
               <a:rPr lang="en-US" smtClean="0"/>
-              <a:t>3/2/2021</a:t>
+              <a:t>3/3/2021</a:t>
             </a:fld>
             <a:endParaRPr lang="en-US"/>
           </a:p>
@@ -5741,7 +5871,7 @@
           <a:p>
             <a:fld id="{3B9F33C8-8A6A-49A2-8949-28E9F813AC6F}" type="datetimeFigureOut">
               <a:rPr lang="en-US" smtClean="0"/>
-              <a:t>3/2/2021</a:t>
+              <a:t>3/3/2021</a:t>
             </a:fld>
             <a:endParaRPr lang="en-US"/>
           </a:p>
@@ -5949,7 +6079,7 @@
           <a:p>
             <a:fld id="{3B9F33C8-8A6A-49A2-8949-28E9F813AC6F}" type="datetimeFigureOut">
               <a:rPr lang="en-US" smtClean="0"/>
-              <a:t>3/2/2021</a:t>
+              <a:t>3/3/2021</a:t>
             </a:fld>
             <a:endParaRPr lang="en-US"/>
           </a:p>
@@ -6147,7 +6277,7 @@
           <a:p>
             <a:fld id="{3B9F33C8-8A6A-49A2-8949-28E9F813AC6F}" type="datetimeFigureOut">
               <a:rPr lang="en-US" smtClean="0"/>
-              <a:t>3/2/2021</a:t>
+              <a:t>3/3/2021</a:t>
             </a:fld>
             <a:endParaRPr lang="en-US"/>
           </a:p>
@@ -6422,7 +6552,7 @@
           <a:p>
             <a:fld id="{3B9F33C8-8A6A-49A2-8949-28E9F813AC6F}" type="datetimeFigureOut">
               <a:rPr lang="en-US" smtClean="0"/>
-              <a:t>3/2/2021</a:t>
+              <a:t>3/3/2021</a:t>
             </a:fld>
             <a:endParaRPr lang="en-US"/>
           </a:p>
@@ -6687,7 +6817,7 @@
           <a:p>
             <a:fld id="{3B9F33C8-8A6A-49A2-8949-28E9F813AC6F}" type="datetimeFigureOut">
               <a:rPr lang="en-US" smtClean="0"/>
-              <a:t>3/2/2021</a:t>
+              <a:t>3/3/2021</a:t>
             </a:fld>
             <a:endParaRPr lang="en-US"/>
           </a:p>
@@ -7099,7 +7229,7 @@
           <a:p>
             <a:fld id="{3B9F33C8-8A6A-49A2-8949-28E9F813AC6F}" type="datetimeFigureOut">
               <a:rPr lang="en-US" smtClean="0"/>
-              <a:t>3/2/2021</a:t>
+              <a:t>3/3/2021</a:t>
             </a:fld>
             <a:endParaRPr lang="en-US"/>
           </a:p>
@@ -7240,7 +7370,7 @@
           <a:p>
             <a:fld id="{3B9F33C8-8A6A-49A2-8949-28E9F813AC6F}" type="datetimeFigureOut">
               <a:rPr lang="en-US" smtClean="0"/>
-              <a:t>3/2/2021</a:t>
+              <a:t>3/3/2021</a:t>
             </a:fld>
             <a:endParaRPr lang="en-US"/>
           </a:p>
@@ -7353,7 +7483,7 @@
           <a:p>
             <a:fld id="{3B9F33C8-8A6A-49A2-8949-28E9F813AC6F}" type="datetimeFigureOut">
               <a:rPr lang="en-US" smtClean="0"/>
-              <a:t>3/2/2021</a:t>
+              <a:t>3/3/2021</a:t>
             </a:fld>
             <a:endParaRPr lang="en-US"/>
           </a:p>
@@ -7664,7 +7794,7 @@
           <a:p>
             <a:fld id="{3B9F33C8-8A6A-49A2-8949-28E9F813AC6F}" type="datetimeFigureOut">
               <a:rPr lang="en-US" smtClean="0"/>
-              <a:t>3/2/2021</a:t>
+              <a:t>3/3/2021</a:t>
             </a:fld>
             <a:endParaRPr lang="en-US"/>
           </a:p>
@@ -7952,7 +8082,7 @@
           <a:p>
             <a:fld id="{3B9F33C8-8A6A-49A2-8949-28E9F813AC6F}" type="datetimeFigureOut">
               <a:rPr lang="en-US" smtClean="0"/>
-              <a:t>3/2/2021</a:t>
+              <a:t>3/3/2021</a:t>
             </a:fld>
             <a:endParaRPr lang="en-US"/>
           </a:p>
@@ -8193,7 +8323,7 @@
           <a:p>
             <a:fld id="{3B9F33C8-8A6A-49A2-8949-28E9F813AC6F}" type="datetimeFigureOut">
               <a:rPr lang="en-US" smtClean="0"/>
-              <a:t>3/2/2021</a:t>
+              <a:t>3/3/2021</a:t>
             </a:fld>
             <a:endParaRPr lang="en-US"/>
           </a:p>
@@ -9021,21 +9151,7 @@
                 <a:latin typeface="Cascadia Code" panose="020B0609020000020004" pitchFamily="49" charset="0"/>
                 <a:cs typeface="Cascadia Code" panose="020B0609020000020004" pitchFamily="49" charset="0"/>
               </a:rPr>
-              <a:t>      if (value != </a:t>
-            </a:r>
-            <a:r>
-              <a:rPr lang="en-US" sz="1200" dirty="0" err="1">
-                <a:latin typeface="Cascadia Code" panose="020B0609020000020004" pitchFamily="49" charset="0"/>
-                <a:cs typeface="Cascadia Code" panose="020B0609020000020004" pitchFamily="49" charset="0"/>
-              </a:rPr>
-              <a:t>this.customerNameValue</a:t>
-            </a:r>
-            <a:r>
-              <a:rPr lang="en-US" sz="1200" dirty="0">
-                <a:latin typeface="Cascadia Code" panose="020B0609020000020004" pitchFamily="49" charset="0"/>
-                <a:cs typeface="Cascadia Code" panose="020B0609020000020004" pitchFamily="49" charset="0"/>
-              </a:rPr>
-              <a:t>)  </a:t>
+              <a:t>      if (value != this.name)  </a:t>
             </a:r>
           </a:p>
           <a:p>
@@ -10901,7 +11017,7 @@
             <p:ph idx="1"/>
             <p:extLst>
               <p:ext uri="{D42A27DB-BD31-4B8C-83A1-F6EECF244321}">
-                <p14:modId xmlns:p14="http://schemas.microsoft.com/office/powerpoint/2010/main" val="588511161"/>
+                <p14:modId xmlns:p14="http://schemas.microsoft.com/office/powerpoint/2010/main" val="2313667894"/>
               </p:ext>
             </p:extLst>
           </p:nvPr>

</xml_diff>